<commit_message>
Domain & UI 업데이트
</commit_message>
<xml_diff>
--- a/document/design/domain.pptx
+++ b/document/design/domain.pptx
@@ -6047,6 +6047,16 @@
                     <a:schemeClr val="tx1"/>
                   </a:solidFill>
                 </a:rPr>
+                <a:t>website: String</a:t>
+              </a:r>
+            </a:p>
+            <a:p>
+              <a:r>
+                <a:rPr kumimoji="1" lang="en-US" altLang="ko-Kore-KR" sz="1000" dirty="0">
+                  <a:solidFill>
+                    <a:schemeClr val="tx1"/>
+                  </a:solidFill>
+                </a:rPr>
                 <a:t>interests: List&lt;Hashtag&gt;</a:t>
               </a:r>
             </a:p>

</xml_diff>